<commit_message>
added more mouse comparisons
</commit_message>
<xml_diff>
--- a/jinlu/EC_new.pptx
+++ b/jinlu/EC_new.pptx
@@ -26,6 +26,8 @@
     <p:sldId id="282" r:id="rId20"/>
     <p:sldId id="285" r:id="rId21"/>
     <p:sldId id="286" r:id="rId22"/>
+    <p:sldId id="287" r:id="rId23"/>
+    <p:sldId id="288" r:id="rId24"/>
   </p:sldIdLst>
   <p:sldSz cx="12192000" cy="6858000"/>
   <p:notesSz cx="6858000" cy="9144000"/>
@@ -165,6 +167,8 @@
           <p14:sldIdLst>
             <p14:sldId id="285"/>
             <p14:sldId id="286"/>
+            <p14:sldId id="287"/>
+            <p14:sldId id="288"/>
           </p14:sldIdLst>
         </p14:section>
       </p14:sectionLst>
@@ -7334,37 +7338,222 @@
           <a:chExt cx="0" cy="0"/>
         </a:xfrm>
       </p:grpSpPr>
-      <p:sp>
-        <p:nvSpPr>
-          <p:cNvPr id="2" name="Title 1">
-            <a:extLst>
-              <a:ext uri="{FF2B5EF4-FFF2-40B4-BE49-F238E27FC236}">
-                <a16:creationId xmlns:a16="http://schemas.microsoft.com/office/drawing/2014/main" id="{00EE83F1-23DC-448E-8D26-BC5165F80340}"/>
-              </a:ext>
-            </a:extLst>
-          </p:cNvPr>
-          <p:cNvSpPr>
-            <a:spLocks noGrp="1"/>
-          </p:cNvSpPr>
-          <p:nvPr>
-            <p:ph type="title"/>
-          </p:nvPr>
-        </p:nvSpPr>
-        <p:spPr/>
-        <p:txBody>
-          <a:bodyPr/>
-          <a:lstStyle/>
-          <a:p>
-            <a:endParaRPr lang="en-GB"/>
-          </a:p>
-        </p:txBody>
-      </p:sp>
       <p:pic>
         <p:nvPicPr>
-          <p:cNvPr id="5" name="Content Placeholder 4">
-            <a:extLst>
-              <a:ext uri="{FF2B5EF4-FFF2-40B4-BE49-F238E27FC236}">
-                <a16:creationId xmlns:a16="http://schemas.microsoft.com/office/drawing/2014/main" id="{9894D03E-6701-4CC8-9F70-BD68F787569A}"/>
+          <p:cNvPr id="3" name="Picture 2">
+            <a:extLst>
+              <a:ext uri="{FF2B5EF4-FFF2-40B4-BE49-F238E27FC236}">
+                <a16:creationId xmlns:a16="http://schemas.microsoft.com/office/drawing/2014/main" id="{B55AAB88-1EEB-0CB2-C6FA-B2E491475652}"/>
+              </a:ext>
+            </a:extLst>
+          </p:cNvPr>
+          <p:cNvPicPr>
+            <a:picLocks noChangeAspect="1"/>
+          </p:cNvPicPr>
+          <p:nvPr/>
+        </p:nvPicPr>
+        <p:blipFill>
+          <a:blip r:embed="rId2">
+            <a:extLst>
+              <a:ext uri="{28A0092B-C50C-407E-A947-70E740481C1C}">
+                <a14:useLocalDpi xmlns:a14="http://schemas.microsoft.com/office/drawing/2010/main" val="0"/>
+              </a:ext>
+            </a:extLst>
+          </a:blip>
+          <a:stretch>
+            <a:fillRect/>
+          </a:stretch>
+        </p:blipFill>
+        <p:spPr>
+          <a:xfrm>
+            <a:off x="5601285" y="332468"/>
+            <a:ext cx="3223378" cy="3223378"/>
+          </a:xfrm>
+          <a:prstGeom prst="rect">
+            <a:avLst/>
+          </a:prstGeom>
+        </p:spPr>
+      </p:pic>
+      <p:pic>
+        <p:nvPicPr>
+          <p:cNvPr id="4" name="Content Placeholder 4">
+            <a:extLst>
+              <a:ext uri="{FF2B5EF4-FFF2-40B4-BE49-F238E27FC236}">
+                <a16:creationId xmlns:a16="http://schemas.microsoft.com/office/drawing/2014/main" id="{2F11FA9F-467B-5601-7952-0747D5D23857}"/>
+              </a:ext>
+            </a:extLst>
+          </p:cNvPr>
+          <p:cNvPicPr>
+            <a:picLocks noChangeAspect="1"/>
+          </p:cNvPicPr>
+          <p:nvPr/>
+        </p:nvPicPr>
+        <p:blipFill>
+          <a:blip r:embed="rId3">
+            <a:extLst>
+              <a:ext uri="{28A0092B-C50C-407E-A947-70E740481C1C}">
+                <a14:useLocalDpi xmlns:a14="http://schemas.microsoft.com/office/drawing/2010/main" val="0"/>
+              </a:ext>
+            </a:extLst>
+          </a:blip>
+          <a:stretch>
+            <a:fillRect/>
+          </a:stretch>
+        </p:blipFill>
+        <p:spPr>
+          <a:xfrm>
+            <a:off x="8824663" y="332468"/>
+            <a:ext cx="2843784" cy="2843784"/>
+          </a:xfrm>
+          <a:prstGeom prst="rect">
+            <a:avLst/>
+          </a:prstGeom>
+        </p:spPr>
+      </p:pic>
+      <p:pic>
+        <p:nvPicPr>
+          <p:cNvPr id="7" name="Picture 6" descr="A graph of different colored bars&#10;&#10;Description automatically generated with medium confidence">
+            <a:extLst>
+              <a:ext uri="{FF2B5EF4-FFF2-40B4-BE49-F238E27FC236}">
+                <a16:creationId xmlns:a16="http://schemas.microsoft.com/office/drawing/2014/main" id="{D3114AB5-B744-5F3F-7FD8-7F4C23AD0283}"/>
+              </a:ext>
+            </a:extLst>
+          </p:cNvPr>
+          <p:cNvPicPr>
+            <a:picLocks noChangeAspect="1"/>
+          </p:cNvPicPr>
+          <p:nvPr/>
+        </p:nvPicPr>
+        <p:blipFill>
+          <a:blip r:embed="rId4">
+            <a:extLst>
+              <a:ext uri="{28A0092B-C50C-407E-A947-70E740481C1C}">
+                <a14:useLocalDpi xmlns:a14="http://schemas.microsoft.com/office/drawing/2010/main" val="0"/>
+              </a:ext>
+            </a:extLst>
+          </a:blip>
+          <a:stretch>
+            <a:fillRect/>
+          </a:stretch>
+        </p:blipFill>
+        <p:spPr>
+          <a:xfrm>
+            <a:off x="1521619" y="332468"/>
+            <a:ext cx="2984500" cy="1968500"/>
+          </a:xfrm>
+          <a:prstGeom prst="rect">
+            <a:avLst/>
+          </a:prstGeom>
+        </p:spPr>
+      </p:pic>
+      <p:pic>
+        <p:nvPicPr>
+          <p:cNvPr id="9" name="Picture 8" descr="A graph with colored lines and dots&#10;&#10;Description automatically generated">
+            <a:extLst>
+              <a:ext uri="{FF2B5EF4-FFF2-40B4-BE49-F238E27FC236}">
+                <a16:creationId xmlns:a16="http://schemas.microsoft.com/office/drawing/2014/main" id="{AF0FC42F-6FBD-C1FE-4E0F-D4643B7F19CE}"/>
+              </a:ext>
+            </a:extLst>
+          </p:cNvPr>
+          <p:cNvPicPr>
+            <a:picLocks noChangeAspect="1"/>
+          </p:cNvPicPr>
+          <p:nvPr/>
+        </p:nvPicPr>
+        <p:blipFill>
+          <a:blip r:embed="rId5">
+            <a:extLst>
+              <a:ext uri="{28A0092B-C50C-407E-A947-70E740481C1C}">
+                <a14:useLocalDpi xmlns:a14="http://schemas.microsoft.com/office/drawing/2010/main" val="0"/>
+              </a:ext>
+            </a:extLst>
+          </a:blip>
+          <a:stretch>
+            <a:fillRect/>
+          </a:stretch>
+        </p:blipFill>
+        <p:spPr>
+          <a:xfrm>
+            <a:off x="6096000" y="3369918"/>
+            <a:ext cx="4686300" cy="3467100"/>
+          </a:xfrm>
+          <a:prstGeom prst="rect">
+            <a:avLst/>
+          </a:prstGeom>
+        </p:spPr>
+      </p:pic>
+      <p:pic>
+        <p:nvPicPr>
+          <p:cNvPr id="13" name="Picture 12" descr="A graph with colored lines and dots&#10;&#10;Description automatically generated">
+            <a:extLst>
+              <a:ext uri="{FF2B5EF4-FFF2-40B4-BE49-F238E27FC236}">
+                <a16:creationId xmlns:a16="http://schemas.microsoft.com/office/drawing/2014/main" id="{087C5107-A4CB-38E5-95DD-F2D039F574FE}"/>
+              </a:ext>
+            </a:extLst>
+          </p:cNvPr>
+          <p:cNvPicPr>
+            <a:picLocks noChangeAspect="1"/>
+          </p:cNvPicPr>
+          <p:nvPr/>
+        </p:nvPicPr>
+        <p:blipFill>
+          <a:blip r:embed="rId6">
+            <a:extLst>
+              <a:ext uri="{28A0092B-C50C-407E-A947-70E740481C1C}">
+                <a14:useLocalDpi xmlns:a14="http://schemas.microsoft.com/office/drawing/2010/main" val="0"/>
+              </a:ext>
+            </a:extLst>
+          </a:blip>
+          <a:stretch>
+            <a:fillRect/>
+          </a:stretch>
+        </p:blipFill>
+        <p:spPr>
+          <a:xfrm>
+            <a:off x="667628" y="3064194"/>
+            <a:ext cx="4686300" cy="3467100"/>
+          </a:xfrm>
+          <a:prstGeom prst="rect">
+            <a:avLst/>
+          </a:prstGeom>
+        </p:spPr>
+      </p:pic>
+    </p:spTree>
+    <p:extLst>
+      <p:ext uri="{BB962C8B-B14F-4D97-AF65-F5344CB8AC3E}">
+        <p14:creationId xmlns:p14="http://schemas.microsoft.com/office/powerpoint/2010/main" val="2529851083"/>
+      </p:ext>
+    </p:extLst>
+  </p:cSld>
+  <p:clrMapOvr>
+    <a:masterClrMapping/>
+  </p:clrMapOvr>
+</p:sld>
+</file>
+
+<file path=ppt/slides/slide22.xml><?xml version="1.0" encoding="utf-8"?>
+<p:sld xmlns:a="http://schemas.openxmlformats.org/drawingml/2006/main" xmlns:r="http://schemas.openxmlformats.org/officeDocument/2006/relationships" xmlns:p="http://schemas.openxmlformats.org/presentationml/2006/main">
+  <p:cSld>
+    <p:spTree>
+      <p:nvGrpSpPr>
+        <p:cNvPr id="1" name=""/>
+        <p:cNvGrpSpPr/>
+        <p:nvPr/>
+      </p:nvGrpSpPr>
+      <p:grpSpPr>
+        <a:xfrm>
+          <a:off x="0" y="0"/>
+          <a:ext cx="0" cy="0"/>
+          <a:chOff x="0" y="0"/>
+          <a:chExt cx="0" cy="0"/>
+        </a:xfrm>
+      </p:grpSpPr>
+      <p:pic>
+        <p:nvPicPr>
+          <p:cNvPr id="5" name="Content Placeholder 4" descr="A close-up of a chart&#10;&#10;Description automatically generated">
+            <a:extLst>
+              <a:ext uri="{FF2B5EF4-FFF2-40B4-BE49-F238E27FC236}">
+                <a16:creationId xmlns:a16="http://schemas.microsoft.com/office/drawing/2014/main" id="{DFC7FBD3-8F5E-9033-05E0-727679414C11}"/>
               </a:ext>
             </a:extLst>
           </p:cNvPr>
@@ -7389,15 +7578,368 @@
         </p:blipFill>
         <p:spPr>
           <a:xfrm>
-            <a:off x="838200" y="1948997"/>
-            <a:ext cx="4351338" cy="4351338"/>
+            <a:off x="4095750" y="688748"/>
+            <a:ext cx="2895600" cy="2641600"/>
           </a:xfrm>
+        </p:spPr>
+      </p:pic>
+      <p:pic>
+        <p:nvPicPr>
+          <p:cNvPr id="7" name="Picture 6" descr="A red and blue squares with black stars&#10;&#10;Description automatically generated">
+            <a:extLst>
+              <a:ext uri="{FF2B5EF4-FFF2-40B4-BE49-F238E27FC236}">
+                <a16:creationId xmlns:a16="http://schemas.microsoft.com/office/drawing/2014/main" id="{4AE030A1-0033-99D0-A7A9-66BA64CE072E}"/>
+              </a:ext>
+            </a:extLst>
+          </p:cNvPr>
+          <p:cNvPicPr>
+            <a:picLocks noChangeAspect="1"/>
+          </p:cNvPicPr>
+          <p:nvPr/>
+        </p:nvPicPr>
+        <p:blipFill>
+          <a:blip r:embed="rId3">
+            <a:extLst>
+              <a:ext uri="{28A0092B-C50C-407E-A947-70E740481C1C}">
+                <a14:useLocalDpi xmlns:a14="http://schemas.microsoft.com/office/drawing/2010/main" val="0"/>
+              </a:ext>
+            </a:extLst>
+          </a:blip>
+          <a:stretch>
+            <a:fillRect/>
+          </a:stretch>
+        </p:blipFill>
+        <p:spPr>
+          <a:xfrm>
+            <a:off x="6487886" y="3330348"/>
+            <a:ext cx="4686300" cy="3467100"/>
+          </a:xfrm>
+          <a:prstGeom prst="rect">
+            <a:avLst/>
+          </a:prstGeom>
+        </p:spPr>
+      </p:pic>
+      <p:pic>
+        <p:nvPicPr>
+          <p:cNvPr id="9" name="Picture 8" descr="A red and blue squares with numbers&#10;&#10;Description automatically generated">
+            <a:extLst>
+              <a:ext uri="{FF2B5EF4-FFF2-40B4-BE49-F238E27FC236}">
+                <a16:creationId xmlns:a16="http://schemas.microsoft.com/office/drawing/2014/main" id="{17446E94-2775-940E-3096-04846E609403}"/>
+              </a:ext>
+            </a:extLst>
+          </p:cNvPr>
+          <p:cNvPicPr>
+            <a:picLocks noChangeAspect="1"/>
+          </p:cNvPicPr>
+          <p:nvPr/>
+        </p:nvPicPr>
+        <p:blipFill>
+          <a:blip r:embed="rId4">
+            <a:extLst>
+              <a:ext uri="{28A0092B-C50C-407E-A947-70E740481C1C}">
+                <a14:useLocalDpi xmlns:a14="http://schemas.microsoft.com/office/drawing/2010/main" val="0"/>
+              </a:ext>
+            </a:extLst>
+          </a:blip>
+          <a:stretch>
+            <a:fillRect/>
+          </a:stretch>
+        </p:blipFill>
+        <p:spPr>
+          <a:xfrm>
+            <a:off x="887186" y="3330348"/>
+            <a:ext cx="4686300" cy="3467100"/>
+          </a:xfrm>
+          <a:prstGeom prst="rect">
+            <a:avLst/>
+          </a:prstGeom>
         </p:spPr>
       </p:pic>
     </p:spTree>
     <p:extLst>
       <p:ext uri="{BB962C8B-B14F-4D97-AF65-F5344CB8AC3E}">
-        <p14:creationId xmlns:p14="http://schemas.microsoft.com/office/powerpoint/2010/main" val="2529851083"/>
+        <p14:creationId xmlns:p14="http://schemas.microsoft.com/office/powerpoint/2010/main" val="3291732258"/>
+      </p:ext>
+    </p:extLst>
+  </p:cSld>
+  <p:clrMapOvr>
+    <a:masterClrMapping/>
+  </p:clrMapOvr>
+</p:sld>
+</file>
+
+<file path=ppt/slides/slide23.xml><?xml version="1.0" encoding="utf-8"?>
+<p:sld xmlns:a="http://schemas.openxmlformats.org/drawingml/2006/main" xmlns:r="http://schemas.openxmlformats.org/officeDocument/2006/relationships" xmlns:p="http://schemas.openxmlformats.org/presentationml/2006/main">
+  <p:cSld>
+    <p:spTree>
+      <p:nvGrpSpPr>
+        <p:cNvPr id="1" name=""/>
+        <p:cNvGrpSpPr/>
+        <p:nvPr/>
+      </p:nvGrpSpPr>
+      <p:grpSpPr>
+        <a:xfrm>
+          <a:off x="0" y="0"/>
+          <a:ext cx="0" cy="0"/>
+          <a:chOff x="0" y="0"/>
+          <a:chExt cx="0" cy="0"/>
+        </a:xfrm>
+      </p:grpSpPr>
+      <p:pic>
+        <p:nvPicPr>
+          <p:cNvPr id="7" name="Picture 6" descr="A diagram of a graph&#10;&#10;Description automatically generated with medium confidence">
+            <a:extLst>
+              <a:ext uri="{FF2B5EF4-FFF2-40B4-BE49-F238E27FC236}">
+                <a16:creationId xmlns:a16="http://schemas.microsoft.com/office/drawing/2014/main" id="{FF57E078-FBE6-C28E-99B5-D3AA8450298E}"/>
+              </a:ext>
+            </a:extLst>
+          </p:cNvPr>
+          <p:cNvPicPr>
+            <a:picLocks noChangeAspect="1"/>
+          </p:cNvPicPr>
+          <p:nvPr/>
+        </p:nvPicPr>
+        <p:blipFill>
+          <a:blip r:embed="rId2">
+            <a:extLst>
+              <a:ext uri="{28A0092B-C50C-407E-A947-70E740481C1C}">
+                <a14:useLocalDpi xmlns:a14="http://schemas.microsoft.com/office/drawing/2010/main" val="0"/>
+              </a:ext>
+            </a:extLst>
+          </a:blip>
+          <a:stretch>
+            <a:fillRect/>
+          </a:stretch>
+        </p:blipFill>
+        <p:spPr>
+          <a:xfrm>
+            <a:off x="4019536" y="757919"/>
+            <a:ext cx="4152928" cy="3072492"/>
+          </a:xfrm>
+          <a:prstGeom prst="rect">
+            <a:avLst/>
+          </a:prstGeom>
+        </p:spPr>
+      </p:pic>
+      <p:pic>
+        <p:nvPicPr>
+          <p:cNvPr id="5" name="Picture 4" descr="A diagram of a number of red squares&#10;&#10;Description automatically generated with medium confidence">
+            <a:extLst>
+              <a:ext uri="{FF2B5EF4-FFF2-40B4-BE49-F238E27FC236}">
+                <a16:creationId xmlns:a16="http://schemas.microsoft.com/office/drawing/2014/main" id="{73AF7777-7421-8110-CA91-22BD49C9A8C6}"/>
+              </a:ext>
+            </a:extLst>
+          </p:cNvPr>
+          <p:cNvPicPr>
+            <a:picLocks noChangeAspect="1"/>
+          </p:cNvPicPr>
+          <p:nvPr/>
+        </p:nvPicPr>
+        <p:blipFill>
+          <a:blip r:embed="rId3">
+            <a:extLst>
+              <a:ext uri="{28A0092B-C50C-407E-A947-70E740481C1C}">
+                <a14:useLocalDpi xmlns:a14="http://schemas.microsoft.com/office/drawing/2010/main" val="0"/>
+              </a:ext>
+            </a:extLst>
+          </a:blip>
+          <a:stretch>
+            <a:fillRect/>
+          </a:stretch>
+        </p:blipFill>
+        <p:spPr>
+          <a:xfrm>
+            <a:off x="55178" y="757919"/>
+            <a:ext cx="4152928" cy="3072492"/>
+          </a:xfrm>
+          <a:prstGeom prst="rect">
+            <a:avLst/>
+          </a:prstGeom>
+        </p:spPr>
+      </p:pic>
+      <p:pic>
+        <p:nvPicPr>
+          <p:cNvPr id="9" name="Picture 8" descr="A diagram of different colors&#10;&#10;Description automatically generated">
+            <a:extLst>
+              <a:ext uri="{FF2B5EF4-FFF2-40B4-BE49-F238E27FC236}">
+                <a16:creationId xmlns:a16="http://schemas.microsoft.com/office/drawing/2014/main" id="{2B1FCB9B-604F-2EAA-209B-23603AB73491}"/>
+              </a:ext>
+            </a:extLst>
+          </p:cNvPr>
+          <p:cNvPicPr>
+            <a:picLocks noChangeAspect="1"/>
+          </p:cNvPicPr>
+          <p:nvPr/>
+        </p:nvPicPr>
+        <p:blipFill>
+          <a:blip r:embed="rId4">
+            <a:extLst>
+              <a:ext uri="{28A0092B-C50C-407E-A947-70E740481C1C}">
+                <a14:useLocalDpi xmlns:a14="http://schemas.microsoft.com/office/drawing/2010/main" val="0"/>
+              </a:ext>
+            </a:extLst>
+          </a:blip>
+          <a:stretch>
+            <a:fillRect/>
+          </a:stretch>
+        </p:blipFill>
+        <p:spPr>
+          <a:xfrm>
+            <a:off x="7983894" y="679639"/>
+            <a:ext cx="4152928" cy="3072492"/>
+          </a:xfrm>
+          <a:prstGeom prst="rect">
+            <a:avLst/>
+          </a:prstGeom>
+        </p:spPr>
+      </p:pic>
+      <p:pic>
+        <p:nvPicPr>
+          <p:cNvPr id="11" name="Picture 10" descr="A diagram of a red square with black stars&#10;&#10;Description automatically generated">
+            <a:extLst>
+              <a:ext uri="{FF2B5EF4-FFF2-40B4-BE49-F238E27FC236}">
+                <a16:creationId xmlns:a16="http://schemas.microsoft.com/office/drawing/2014/main" id="{33C3ED7A-E417-0648-146E-7206C0FF9DA6}"/>
+              </a:ext>
+            </a:extLst>
+          </p:cNvPr>
+          <p:cNvPicPr>
+            <a:picLocks noChangeAspect="1"/>
+          </p:cNvPicPr>
+          <p:nvPr/>
+        </p:nvPicPr>
+        <p:blipFill>
+          <a:blip r:embed="rId5">
+            <a:extLst>
+              <a:ext uri="{28A0092B-C50C-407E-A947-70E740481C1C}">
+                <a14:useLocalDpi xmlns:a14="http://schemas.microsoft.com/office/drawing/2010/main" val="0"/>
+              </a:ext>
+            </a:extLst>
+          </a:blip>
+          <a:stretch>
+            <a:fillRect/>
+          </a:stretch>
+        </p:blipFill>
+        <p:spPr>
+          <a:xfrm>
+            <a:off x="1" y="3823607"/>
+            <a:ext cx="4152928" cy="3072492"/>
+          </a:xfrm>
+          <a:prstGeom prst="rect">
+            <a:avLst/>
+          </a:prstGeom>
+        </p:spPr>
+      </p:pic>
+      <p:pic>
+        <p:nvPicPr>
+          <p:cNvPr id="13" name="Picture 12" descr="A diagram of a red and blue squares with black stars&#10;&#10;Description automatically generated">
+            <a:extLst>
+              <a:ext uri="{FF2B5EF4-FFF2-40B4-BE49-F238E27FC236}">
+                <a16:creationId xmlns:a16="http://schemas.microsoft.com/office/drawing/2014/main" id="{604BD6F4-D6EB-617A-B733-7436B95AA47B}"/>
+              </a:ext>
+            </a:extLst>
+          </p:cNvPr>
+          <p:cNvPicPr>
+            <a:picLocks noChangeAspect="1"/>
+          </p:cNvPicPr>
+          <p:nvPr/>
+        </p:nvPicPr>
+        <p:blipFill>
+          <a:blip r:embed="rId6">
+            <a:extLst>
+              <a:ext uri="{28A0092B-C50C-407E-A947-70E740481C1C}">
+                <a14:useLocalDpi xmlns:a14="http://schemas.microsoft.com/office/drawing/2010/main" val="0"/>
+              </a:ext>
+            </a:extLst>
+          </a:blip>
+          <a:stretch>
+            <a:fillRect/>
+          </a:stretch>
+        </p:blipFill>
+        <p:spPr>
+          <a:xfrm>
+            <a:off x="4019536" y="3837214"/>
+            <a:ext cx="4019535" cy="2973802"/>
+          </a:xfrm>
+          <a:prstGeom prst="rect">
+            <a:avLst/>
+          </a:prstGeom>
+        </p:spPr>
+      </p:pic>
+      <p:pic>
+        <p:nvPicPr>
+          <p:cNvPr id="15" name="Picture 14" descr="A diagram of a red and blue box&#10;&#10;Description automatically generated with medium confidence">
+            <a:extLst>
+              <a:ext uri="{FF2B5EF4-FFF2-40B4-BE49-F238E27FC236}">
+                <a16:creationId xmlns:a16="http://schemas.microsoft.com/office/drawing/2014/main" id="{FEEB3A78-6CA9-EE91-CC2B-A58FF5DC9675}"/>
+              </a:ext>
+            </a:extLst>
+          </p:cNvPr>
+          <p:cNvPicPr>
+            <a:picLocks noChangeAspect="1"/>
+          </p:cNvPicPr>
+          <p:nvPr/>
+        </p:nvPicPr>
+        <p:blipFill>
+          <a:blip r:embed="rId7">
+            <a:extLst>
+              <a:ext uri="{28A0092B-C50C-407E-A947-70E740481C1C}">
+                <a14:useLocalDpi xmlns:a14="http://schemas.microsoft.com/office/drawing/2010/main" val="0"/>
+              </a:ext>
+            </a:extLst>
+          </a:blip>
+          <a:stretch>
+            <a:fillRect/>
+          </a:stretch>
+        </p:blipFill>
+        <p:spPr>
+          <a:xfrm>
+            <a:off x="7928717" y="3703864"/>
+            <a:ext cx="4263283" cy="3154136"/>
+          </a:xfrm>
+          <a:prstGeom prst="rect">
+            <a:avLst/>
+          </a:prstGeom>
+        </p:spPr>
+      </p:pic>
+      <p:sp>
+        <p:nvSpPr>
+          <p:cNvPr id="18" name="TextBox 17">
+            <a:extLst>
+              <a:ext uri="{FF2B5EF4-FFF2-40B4-BE49-F238E27FC236}">
+                <a16:creationId xmlns:a16="http://schemas.microsoft.com/office/drawing/2014/main" id="{690946CC-A425-3AA5-9EF0-4D40C4656B90}"/>
+              </a:ext>
+            </a:extLst>
+          </p:cNvPr>
+          <p:cNvSpPr txBox="1"/>
+          <p:nvPr/>
+        </p:nvSpPr>
+        <p:spPr>
+          <a:xfrm>
+            <a:off x="2025353" y="149687"/>
+            <a:ext cx="7887767" cy="646331"/>
+          </a:xfrm>
+          <a:prstGeom prst="rect">
+            <a:avLst/>
+          </a:prstGeom>
+          <a:noFill/>
+        </p:spPr>
+        <p:txBody>
+          <a:bodyPr wrap="square" rtlCol="0">
+            <a:spAutoFit/>
+          </a:bodyPr>
+          <a:lstStyle/>
+          <a:p>
+            <a:r>
+              <a:rPr lang="en-US" dirty="0"/>
+              <a:t>Estimated Covariance of projection strength between two regions, with stars indicating 95% CI not containing zero</a:t>
+            </a:r>
+          </a:p>
+        </p:txBody>
+      </p:sp>
+    </p:spTree>
+    <p:extLst>
+      <p:ext uri="{BB962C8B-B14F-4D97-AF65-F5344CB8AC3E}">
+        <p14:creationId xmlns:p14="http://schemas.microsoft.com/office/powerpoint/2010/main" val="372816673"/>
       </p:ext>
     </p:extLst>
   </p:cSld>

</xml_diff>